<commit_message>
updated dc 3 slides
</commit_message>
<xml_diff>
--- a/Data Challenge 3/Gwen_Spencer_Slides_DC3.pptx
+++ b/Data Challenge 3/Gwen_Spencer_Slides_DC3.pptx
@@ -17,23 +17,24 @@
     <p:sldId id="262" r:id="rId12"/>
     <p:sldId id="263" r:id="rId13"/>
     <p:sldId id="264" r:id="rId14"/>
+    <p:sldId id="265" r:id="rId15"/>
   </p:sldIdLst>
   <p:sldSz cy="5143500" cx="9144000"/>
   <p:notesSz cx="6858000" cy="9144000"/>
   <p:embeddedFontLst>
     <p:embeddedFont>
       <p:font typeface="Raleway"/>
-      <p:regular r:id="rId15"/>
-      <p:bold r:id="rId16"/>
-      <p:italic r:id="rId17"/>
-      <p:boldItalic r:id="rId18"/>
+      <p:regular r:id="rId16"/>
+      <p:bold r:id="rId17"/>
+      <p:italic r:id="rId18"/>
+      <p:boldItalic r:id="rId19"/>
     </p:embeddedFont>
     <p:embeddedFont>
       <p:font typeface="Lato"/>
-      <p:regular r:id="rId19"/>
-      <p:bold r:id="rId20"/>
-      <p:italic r:id="rId21"/>
-      <p:boldItalic r:id="rId22"/>
+      <p:regular r:id="rId20"/>
+      <p:bold r:id="rId21"/>
+      <p:italic r:id="rId22"/>
+      <p:boldItalic r:id="rId23"/>
     </p:embeddedFont>
   </p:embeddedFontLst>
   <p:defaultTextStyle>
@@ -807,6 +808,105 @@
 </p:notes>
 </file>
 
+<file path=ppt/notesSlides/notesSlide10.xml><?xml version="1.0" encoding="utf-8"?>
+<p:notes xmlns:a="http://schemas.openxmlformats.org/drawingml/2006/main" xmlns:r="http://schemas.openxmlformats.org/officeDocument/2006/relationships" xmlns:mc="http://schemas.openxmlformats.org/markup-compatibility/2006" xmlns:mv="urn:schemas-microsoft-com:mac:vml" xmlns:p="http://schemas.openxmlformats.org/presentationml/2006/main" xmlns:c="http://schemas.openxmlformats.org/drawingml/2006/chart" xmlns:dgm="http://schemas.openxmlformats.org/drawingml/2006/diagram" xmlns:o="urn:schemas-microsoft-com:office:office" xmlns:v="urn:schemas-microsoft-com:vml" xmlns:pvml="urn:schemas-microsoft-com:office:powerpoint" xmlns:com="http://schemas.openxmlformats.org/drawingml/2006/compatibility" xmlns:p14="http://schemas.microsoft.com/office/powerpoint/2010/main" xmlns:p15="http://schemas.microsoft.com/office/powerpoint/2012/main" showMasterPhAnim="0" showMasterSp="0">
+  <p:cSld>
+    <p:spTree>
+      <p:nvGrpSpPr>
+        <p:cNvPr id="146" name="Shape 146"/>
+        <p:cNvGrpSpPr/>
+        <p:nvPr/>
+      </p:nvGrpSpPr>
+      <p:grpSpPr>
+        <a:xfrm>
+          <a:off x="0" y="0"/>
+          <a:ext cx="0" cy="0"/>
+          <a:chOff x="0" y="0"/>
+          <a:chExt cx="0" cy="0"/>
+        </a:xfrm>
+      </p:grpSpPr>
+      <p:sp>
+        <p:nvSpPr>
+          <p:cNvPr id="147" name="Google Shape;147;g51b892b955_0_134:notes"/>
+          <p:cNvSpPr/>
+          <p:nvPr>
+            <p:ph idx="2" type="sldImg"/>
+          </p:nvPr>
+        </p:nvSpPr>
+        <p:spPr>
+          <a:xfrm>
+            <a:off x="381300" y="685800"/>
+            <a:ext cx="6096000" cy="3429000"/>
+          </a:xfrm>
+          <a:custGeom>
+            <a:rect b="b" l="l" r="r" t="t"/>
+            <a:pathLst>
+              <a:path extrusionOk="0" h="120000" w="120000">
+                <a:moveTo>
+                  <a:pt x="0" y="0"/>
+                </a:moveTo>
+                <a:lnTo>
+                  <a:pt x="120000" y="0"/>
+                </a:lnTo>
+                <a:lnTo>
+                  <a:pt x="120000" y="120000"/>
+                </a:lnTo>
+                <a:lnTo>
+                  <a:pt x="0" y="120000"/>
+                </a:lnTo>
+                <a:close/>
+              </a:path>
+            </a:pathLst>
+          </a:custGeom>
+        </p:spPr>
+      </p:sp>
+      <p:sp>
+        <p:nvSpPr>
+          <p:cNvPr id="148" name="Google Shape;148;g51b892b955_0_134:notes"/>
+          <p:cNvSpPr txBox="1"/>
+          <p:nvPr>
+            <p:ph idx="1" type="body"/>
+          </p:nvPr>
+        </p:nvSpPr>
+        <p:spPr>
+          <a:xfrm>
+            <a:off x="685800" y="4343400"/>
+            <a:ext cx="5486400" cy="4114800"/>
+          </a:xfrm>
+          <a:prstGeom prst="rect">
+            <a:avLst/>
+          </a:prstGeom>
+        </p:spPr>
+        <p:txBody>
+          <a:bodyPr anchorCtr="0" anchor="t" bIns="91425" lIns="91425" spcFirstLastPara="1" rIns="91425" wrap="square" tIns="91425">
+            <a:noAutofit/>
+          </a:bodyPr>
+          <a:lstStyle/>
+          <a:p>
+            <a:pPr indent="0" lvl="0" marL="0" rtl="0" algn="l">
+              <a:spcBef>
+                <a:spcPts val="0"/>
+              </a:spcBef>
+              <a:spcAft>
+                <a:spcPts val="0"/>
+              </a:spcAft>
+              <a:buNone/>
+            </a:pPr>
+            <a:r>
+              <a:t/>
+            </a:r>
+            <a:endParaRPr/>
+          </a:p>
+        </p:txBody>
+      </p:sp>
+    </p:spTree>
+  </p:cSld>
+  <p:clrMapOvr>
+    <a:masterClrMapping/>
+  </p:clrMapOvr>
+</p:notes>
+</file>
+
 <file path=ppt/notesSlides/notesSlide2.xml><?xml version="1.0" encoding="utf-8"?>
 <p:notes xmlns:a="http://schemas.openxmlformats.org/drawingml/2006/main" xmlns:r="http://schemas.openxmlformats.org/officeDocument/2006/relationships" xmlns:mc="http://schemas.openxmlformats.org/markup-compatibility/2006" xmlns:mv="urn:schemas-microsoft-com:mac:vml" xmlns:p="http://schemas.openxmlformats.org/presentationml/2006/main" xmlns:c="http://schemas.openxmlformats.org/drawingml/2006/chart" xmlns:dgm="http://schemas.openxmlformats.org/drawingml/2006/diagram" xmlns:o="urn:schemas-microsoft-com:office:office" xmlns:v="urn:schemas-microsoft-com:vml" xmlns:pvml="urn:schemas-microsoft-com:office:powerpoint" xmlns:com="http://schemas.openxmlformats.org/drawingml/2006/compatibility" xmlns:p14="http://schemas.microsoft.com/office/powerpoint/2010/main" xmlns:p15="http://schemas.microsoft.com/office/powerpoint/2012/main" showMasterPhAnim="0" showMasterSp="0">
   <p:cSld>
@@ -1123,7 +1223,7 @@
       </p:grpSpPr>
       <p:sp>
         <p:nvSpPr>
-          <p:cNvPr id="110" name="Google Shape;110;g51b892b955_0_140:notes"/>
+          <p:cNvPr id="110" name="Google Shape;110;g51b892b955_0_155:notes"/>
           <p:cNvSpPr/>
           <p:nvPr>
             <p:ph idx="2" type="sldImg"/>
@@ -1158,7 +1258,7 @@
       </p:sp>
       <p:sp>
         <p:nvSpPr>
-          <p:cNvPr id="111" name="Google Shape;111;g51b892b955_0_140:notes"/>
+          <p:cNvPr id="111" name="Google Shape;111;g51b892b955_0_155:notes"/>
           <p:cNvSpPr txBox="1"/>
           <p:nvPr>
             <p:ph idx="1" type="body"/>
@@ -1208,7 +1308,7 @@
   <p:cSld>
     <p:spTree>
       <p:nvGrpSpPr>
-        <p:cNvPr id="115" name="Shape 115"/>
+        <p:cNvPr id="119" name="Shape 119"/>
         <p:cNvGrpSpPr/>
         <p:nvPr/>
       </p:nvGrpSpPr>
@@ -1222,7 +1322,7 @@
       </p:grpSpPr>
       <p:sp>
         <p:nvSpPr>
-          <p:cNvPr id="116" name="Google Shape;116;g51b892b955_0_100:notes"/>
+          <p:cNvPr id="120" name="Google Shape;120;g51b892b955_0_140:notes"/>
           <p:cNvSpPr/>
           <p:nvPr>
             <p:ph idx="2" type="sldImg"/>
@@ -1257,7 +1357,7 @@
       </p:sp>
       <p:sp>
         <p:nvSpPr>
-          <p:cNvPr id="117" name="Google Shape;117;g51b892b955_0_100:notes"/>
+          <p:cNvPr id="121" name="Google Shape;121;g51b892b955_0_140:notes"/>
           <p:cNvSpPr txBox="1"/>
           <p:nvPr>
             <p:ph idx="1" type="body"/>
@@ -1307,7 +1407,7 @@
   <p:cSld>
     <p:spTree>
       <p:nvGrpSpPr>
-        <p:cNvPr id="124" name="Shape 124"/>
+        <p:cNvPr id="125" name="Shape 125"/>
         <p:cNvGrpSpPr/>
         <p:nvPr/>
       </p:nvGrpSpPr>
@@ -1321,7 +1421,7 @@
       </p:grpSpPr>
       <p:sp>
         <p:nvSpPr>
-          <p:cNvPr id="125" name="Google Shape;125;g51b892b955_0_114:notes"/>
+          <p:cNvPr id="126" name="Google Shape;126;g51b892b955_0_100:notes"/>
           <p:cNvSpPr/>
           <p:nvPr>
             <p:ph idx="2" type="sldImg"/>
@@ -1356,7 +1456,7 @@
       </p:sp>
       <p:sp>
         <p:nvSpPr>
-          <p:cNvPr id="126" name="Google Shape;126;g51b892b955_0_114:notes"/>
+          <p:cNvPr id="127" name="Google Shape;127;g51b892b955_0_100:notes"/>
           <p:cNvSpPr txBox="1"/>
           <p:nvPr>
             <p:ph idx="1" type="body"/>
@@ -1406,7 +1506,7 @@
   <p:cSld>
     <p:spTree>
       <p:nvGrpSpPr>
-        <p:cNvPr id="130" name="Shape 130"/>
+        <p:cNvPr id="134" name="Shape 134"/>
         <p:cNvGrpSpPr/>
         <p:nvPr/>
       </p:nvGrpSpPr>
@@ -1420,7 +1520,7 @@
       </p:grpSpPr>
       <p:sp>
         <p:nvSpPr>
-          <p:cNvPr id="131" name="Google Shape;131;g51b892b955_0_120:notes"/>
+          <p:cNvPr id="135" name="Google Shape;135;g51b892b955_0_114:notes"/>
           <p:cNvSpPr/>
           <p:nvPr>
             <p:ph idx="2" type="sldImg"/>
@@ -1455,7 +1555,7 @@
       </p:sp>
       <p:sp>
         <p:nvSpPr>
-          <p:cNvPr id="132" name="Google Shape;132;g51b892b955_0_120:notes"/>
+          <p:cNvPr id="136" name="Google Shape;136;g51b892b955_0_114:notes"/>
           <p:cNvSpPr txBox="1"/>
           <p:nvPr>
             <p:ph idx="1" type="body"/>
@@ -1505,7 +1605,7 @@
   <p:cSld>
     <p:spTree>
       <p:nvGrpSpPr>
-        <p:cNvPr id="136" name="Shape 136"/>
+        <p:cNvPr id="140" name="Shape 140"/>
         <p:cNvGrpSpPr/>
         <p:nvPr/>
       </p:nvGrpSpPr>
@@ -1519,7 +1619,7 @@
       </p:grpSpPr>
       <p:sp>
         <p:nvSpPr>
-          <p:cNvPr id="137" name="Google Shape;137;g51b892b955_0_134:notes"/>
+          <p:cNvPr id="141" name="Google Shape;141;g51b892b955_0_120:notes"/>
           <p:cNvSpPr/>
           <p:nvPr>
             <p:ph idx="2" type="sldImg"/>
@@ -1554,7 +1654,7 @@
       </p:sp>
       <p:sp>
         <p:nvSpPr>
-          <p:cNvPr id="138" name="Google Shape;138;g51b892b955_0_134:notes"/>
+          <p:cNvPr id="142" name="Google Shape;142;g51b892b955_0_120:notes"/>
           <p:cNvSpPr txBox="1"/>
           <p:nvPr>
             <p:ph idx="1" type="body"/>
@@ -8291,6 +8391,343 @@
 </p:sld>
 </file>
 
+<file path=ppt/slides/slide10.xml><?xml version="1.0" encoding="utf-8"?>
+<p:sld xmlns:a="http://schemas.openxmlformats.org/drawingml/2006/main" xmlns:r="http://schemas.openxmlformats.org/officeDocument/2006/relationships" xmlns:mc="http://schemas.openxmlformats.org/markup-compatibility/2006" xmlns:mv="urn:schemas-microsoft-com:mac:vml" xmlns:p="http://schemas.openxmlformats.org/presentationml/2006/main" xmlns:c="http://schemas.openxmlformats.org/drawingml/2006/chart" xmlns:dgm="http://schemas.openxmlformats.org/drawingml/2006/diagram" xmlns:o="urn:schemas-microsoft-com:office:office" xmlns:v="urn:schemas-microsoft-com:vml" xmlns:pvml="urn:schemas-microsoft-com:office:powerpoint" xmlns:com="http://schemas.openxmlformats.org/drawingml/2006/compatibility" xmlns:p14="http://schemas.microsoft.com/office/powerpoint/2010/main" xmlns:p15="http://schemas.microsoft.com/office/powerpoint/2012/main">
+  <p:cSld>
+    <p:spTree>
+      <p:nvGrpSpPr>
+        <p:cNvPr id="149" name="Shape 149"/>
+        <p:cNvGrpSpPr/>
+        <p:nvPr/>
+      </p:nvGrpSpPr>
+      <p:grpSpPr>
+        <a:xfrm>
+          <a:off x="0" y="0"/>
+          <a:ext cx="0" cy="0"/>
+          <a:chOff x="0" y="0"/>
+          <a:chExt cx="0" cy="0"/>
+        </a:xfrm>
+      </p:grpSpPr>
+      <p:sp>
+        <p:nvSpPr>
+          <p:cNvPr id="150" name="Google Shape;150;p22"/>
+          <p:cNvSpPr txBox="1"/>
+          <p:nvPr>
+            <p:ph type="title"/>
+          </p:nvPr>
+        </p:nvSpPr>
+        <p:spPr>
+          <a:xfrm>
+            <a:off x="729450" y="482650"/>
+            <a:ext cx="7688700" cy="1371000"/>
+          </a:xfrm>
+          <a:prstGeom prst="rect">
+            <a:avLst/>
+          </a:prstGeom>
+        </p:spPr>
+        <p:txBody>
+          <a:bodyPr anchorCtr="0" anchor="t" bIns="91425" lIns="91425" spcFirstLastPara="1" rIns="91425" wrap="square" tIns="91425">
+            <a:noAutofit/>
+          </a:bodyPr>
+          <a:lstStyle/>
+          <a:p>
+            <a:pPr indent="0" lvl="0" marL="0" rtl="0" algn="l">
+              <a:spcBef>
+                <a:spcPts val="0"/>
+              </a:spcBef>
+              <a:spcAft>
+                <a:spcPts val="0"/>
+              </a:spcAft>
+              <a:buNone/>
+            </a:pPr>
+            <a:r>
+              <a:rPr lang="en" sz="3000"/>
+              <a:t>Revenue varies by Traffic Source:</a:t>
+            </a:r>
+            <a:endParaRPr sz="3000"/>
+          </a:p>
+        </p:txBody>
+      </p:sp>
+      <p:sp>
+        <p:nvSpPr>
+          <p:cNvPr id="151" name="Google Shape;151;p22"/>
+          <p:cNvSpPr txBox="1"/>
+          <p:nvPr/>
+        </p:nvSpPr>
+        <p:spPr>
+          <a:xfrm>
+            <a:off x="620150" y="1649350"/>
+            <a:ext cx="8418300" cy="2949900"/>
+          </a:xfrm>
+          <a:prstGeom prst="rect">
+            <a:avLst/>
+          </a:prstGeom>
+          <a:noFill/>
+          <a:ln>
+            <a:noFill/>
+          </a:ln>
+        </p:spPr>
+        <p:txBody>
+          <a:bodyPr anchorCtr="0" anchor="t" bIns="91425" lIns="91425" spcFirstLastPara="1" rIns="91425" wrap="square" tIns="91425">
+            <a:noAutofit/>
+          </a:bodyPr>
+          <a:lstStyle/>
+          <a:p>
+            <a:pPr indent="0" lvl="0" marL="0" rtl="0" algn="l">
+              <a:lnSpc>
+                <a:spcPct val="115000"/>
+              </a:lnSpc>
+              <a:spcBef>
+                <a:spcPts val="0"/>
+              </a:spcBef>
+              <a:spcAft>
+                <a:spcPts val="0"/>
+              </a:spcAft>
+              <a:buNone/>
+            </a:pPr>
+            <a:r>
+              <a:rPr lang="en" sz="2400">
+                <a:latin typeface="Lato"/>
+                <a:ea typeface="Lato"/>
+                <a:cs typeface="Lato"/>
+                <a:sym typeface="Lato"/>
+              </a:rPr>
+              <a:t>Margin (</a:t>
+            </a:r>
+            <a:r>
+              <a:rPr i="1" lang="en" sz="2400">
+                <a:latin typeface="Lato"/>
+                <a:ea typeface="Lato"/>
+                <a:cs typeface="Lato"/>
+                <a:sym typeface="Lato"/>
+              </a:rPr>
+              <a:t>Google</a:t>
+            </a:r>
+            <a:r>
+              <a:rPr lang="en" sz="2400">
+                <a:latin typeface="Lato"/>
+                <a:ea typeface="Lato"/>
+                <a:cs typeface="Lato"/>
+                <a:sym typeface="Lato"/>
+              </a:rPr>
+              <a:t>) =</a:t>
+            </a:r>
+            <a:endParaRPr sz="2400">
+              <a:latin typeface="Lato"/>
+              <a:ea typeface="Lato"/>
+              <a:cs typeface="Lato"/>
+              <a:sym typeface="Lato"/>
+            </a:endParaRPr>
+          </a:p>
+          <a:p>
+            <a:pPr indent="457200" lvl="0" marL="0" rtl="0" algn="l">
+              <a:lnSpc>
+                <a:spcPct val="115000"/>
+              </a:lnSpc>
+              <a:spcBef>
+                <a:spcPts val="0"/>
+              </a:spcBef>
+              <a:spcAft>
+                <a:spcPts val="0"/>
+              </a:spcAft>
+              <a:buNone/>
+            </a:pPr>
+            <a:r>
+              <a:rPr lang="en" sz="2400">
+                <a:latin typeface="Lato"/>
+                <a:ea typeface="Lato"/>
+                <a:cs typeface="Lato"/>
+                <a:sym typeface="Lato"/>
+              </a:rPr>
+              <a:t>Revenue-per-click-through(</a:t>
+            </a:r>
+            <a:r>
+              <a:rPr i="1" lang="en" sz="2400">
+                <a:latin typeface="Lato"/>
+                <a:ea typeface="Lato"/>
+                <a:cs typeface="Lato"/>
+                <a:sym typeface="Lato"/>
+              </a:rPr>
+              <a:t>Google</a:t>
+            </a:r>
+            <a:r>
+              <a:rPr lang="en" sz="2400">
+                <a:latin typeface="Lato"/>
+                <a:ea typeface="Lato"/>
+                <a:cs typeface="Lato"/>
+                <a:sym typeface="Lato"/>
+              </a:rPr>
+              <a:t>) - </a:t>
+            </a:r>
+            <a:endParaRPr sz="2400">
+              <a:latin typeface="Lato"/>
+              <a:ea typeface="Lato"/>
+              <a:cs typeface="Lato"/>
+              <a:sym typeface="Lato"/>
+            </a:endParaRPr>
+          </a:p>
+          <a:p>
+            <a:pPr indent="457200" lvl="0" marL="457200" rtl="0" algn="l">
+              <a:lnSpc>
+                <a:spcPct val="115000"/>
+              </a:lnSpc>
+              <a:spcBef>
+                <a:spcPts val="0"/>
+              </a:spcBef>
+              <a:spcAft>
+                <a:spcPts val="0"/>
+              </a:spcAft>
+              <a:buNone/>
+            </a:pPr>
+            <a:r>
+              <a:rPr lang="en" sz="2400">
+                <a:latin typeface="Lato"/>
+                <a:ea typeface="Lato"/>
+                <a:cs typeface="Lato"/>
+                <a:sym typeface="Lato"/>
+              </a:rPr>
+              <a:t>					Cost-per-click-through(</a:t>
+            </a:r>
+            <a:r>
+              <a:rPr i="1" lang="en" sz="2400">
+                <a:latin typeface="Lato"/>
+                <a:ea typeface="Lato"/>
+                <a:cs typeface="Lato"/>
+                <a:sym typeface="Lato"/>
+              </a:rPr>
+              <a:t>Google</a:t>
+            </a:r>
+            <a:r>
+              <a:rPr lang="en" sz="2400">
+                <a:latin typeface="Lato"/>
+                <a:ea typeface="Lato"/>
+                <a:cs typeface="Lato"/>
+                <a:sym typeface="Lato"/>
+              </a:rPr>
+              <a:t>)</a:t>
+            </a:r>
+            <a:endParaRPr sz="2400">
+              <a:latin typeface="Lato"/>
+              <a:ea typeface="Lato"/>
+              <a:cs typeface="Lato"/>
+              <a:sym typeface="Lato"/>
+            </a:endParaRPr>
+          </a:p>
+          <a:p>
+            <a:pPr indent="457200" lvl="0" marL="457200" rtl="0" algn="l">
+              <a:lnSpc>
+                <a:spcPct val="115000"/>
+              </a:lnSpc>
+              <a:spcBef>
+                <a:spcPts val="0"/>
+              </a:spcBef>
+              <a:spcAft>
+                <a:spcPts val="0"/>
+              </a:spcAft>
+              <a:buNone/>
+            </a:pPr>
+            <a:r>
+              <a:t/>
+            </a:r>
+            <a:endParaRPr sz="2400">
+              <a:latin typeface="Lato"/>
+              <a:ea typeface="Lato"/>
+              <a:cs typeface="Lato"/>
+              <a:sym typeface="Lato"/>
+            </a:endParaRPr>
+          </a:p>
+          <a:p>
+            <a:pPr indent="457200" lvl="0" marL="457200" rtl="0" algn="l">
+              <a:lnSpc>
+                <a:spcPct val="115000"/>
+              </a:lnSpc>
+              <a:spcBef>
+                <a:spcPts val="0"/>
+              </a:spcBef>
+              <a:spcAft>
+                <a:spcPts val="0"/>
+              </a:spcAft>
+              <a:buNone/>
+            </a:pPr>
+            <a:r>
+              <a:t/>
+            </a:r>
+            <a:endParaRPr sz="2400">
+              <a:latin typeface="Lato"/>
+              <a:ea typeface="Lato"/>
+              <a:cs typeface="Lato"/>
+              <a:sym typeface="Lato"/>
+            </a:endParaRPr>
+          </a:p>
+          <a:p>
+            <a:pPr indent="457200" lvl="0" marL="0" rtl="0" algn="l">
+              <a:lnSpc>
+                <a:spcPct val="115000"/>
+              </a:lnSpc>
+              <a:spcBef>
+                <a:spcPts val="0"/>
+              </a:spcBef>
+              <a:spcAft>
+                <a:spcPts val="0"/>
+              </a:spcAft>
+              <a:buNone/>
+            </a:pPr>
+            <a:r>
+              <a:rPr b="1" lang="en" sz="2400">
+                <a:solidFill>
+                  <a:srgbClr val="0000FF"/>
+                </a:solidFill>
+                <a:latin typeface="Lato"/>
+                <a:ea typeface="Lato"/>
+                <a:cs typeface="Lato"/>
+                <a:sym typeface="Lato"/>
+              </a:rPr>
+              <a:t>Shift budget towards H</a:t>
+            </a:r>
+            <a:r>
+              <a:rPr b="1" lang="en" sz="2400">
+                <a:solidFill>
+                  <a:srgbClr val="0000FF"/>
+                </a:solidFill>
+                <a:latin typeface="Lato"/>
+                <a:ea typeface="Lato"/>
+                <a:cs typeface="Lato"/>
+                <a:sym typeface="Lato"/>
+              </a:rPr>
+              <a:t>ighest-Margin</a:t>
+            </a:r>
+            <a:r>
+              <a:rPr b="1" lang="en" sz="2400">
+                <a:solidFill>
+                  <a:srgbClr val="0000FF"/>
+                </a:solidFill>
+                <a:latin typeface="Lato"/>
+                <a:ea typeface="Lato"/>
+                <a:cs typeface="Lato"/>
+                <a:sym typeface="Lato"/>
+              </a:rPr>
+              <a:t> search engines </a:t>
+            </a:r>
+            <a:endParaRPr b="1" sz="2400">
+              <a:solidFill>
+                <a:srgbClr val="0000FF"/>
+              </a:solidFill>
+              <a:latin typeface="Lato"/>
+              <a:ea typeface="Lato"/>
+              <a:cs typeface="Lato"/>
+              <a:sym typeface="Lato"/>
+            </a:endParaRPr>
+          </a:p>
+        </p:txBody>
+      </p:sp>
+    </p:spTree>
+  </p:cSld>
+  <p:clrMapOvr>
+    <a:masterClrMapping/>
+  </p:clrMapOvr>
+</p:sld>
+</file>
+
 <file path=ppt/slides/slide2.xml><?xml version="1.0" encoding="utf-8"?>
 <p:sld xmlns:a="http://schemas.openxmlformats.org/drawingml/2006/main" xmlns:r="http://schemas.openxmlformats.org/officeDocument/2006/relationships" xmlns:mc="http://schemas.openxmlformats.org/markup-compatibility/2006" xmlns:mv="urn:schemas-microsoft-com:mac:vml" xmlns:p="http://schemas.openxmlformats.org/presentationml/2006/main" xmlns:c="http://schemas.openxmlformats.org/drawingml/2006/chart" xmlns:dgm="http://schemas.openxmlformats.org/drawingml/2006/diagram" xmlns:o="urn:schemas-microsoft-com:office:office" xmlns:v="urn:schemas-microsoft-com:vml" xmlns:pvml="urn:schemas-microsoft-com:office:powerpoint" xmlns:com="http://schemas.openxmlformats.org/drawingml/2006/compatibility" xmlns:p14="http://schemas.microsoft.com/office/powerpoint/2010/main" xmlns:p15="http://schemas.microsoft.com/office/powerpoint/2012/main">
   <p:cSld>
@@ -8928,6 +9365,46 @@
               <a:sym typeface="Lato"/>
             </a:endParaRPr>
           </a:p>
+          <a:p>
+            <a:pPr indent="0" lvl="0" marL="0" rtl="0" algn="ctr">
+              <a:spcBef>
+                <a:spcPts val="0"/>
+              </a:spcBef>
+              <a:spcAft>
+                <a:spcPts val="0"/>
+              </a:spcAft>
+              <a:buNone/>
+            </a:pPr>
+            <a:r>
+              <a:t/>
+            </a:r>
+            <a:endParaRPr b="1" sz="4800">
+              <a:latin typeface="Lato"/>
+              <a:ea typeface="Lato"/>
+              <a:cs typeface="Lato"/>
+              <a:sym typeface="Lato"/>
+            </a:endParaRPr>
+          </a:p>
+          <a:p>
+            <a:pPr indent="0" lvl="0" marL="0" rtl="0" algn="ctr">
+              <a:spcBef>
+                <a:spcPts val="0"/>
+              </a:spcBef>
+              <a:spcAft>
+                <a:spcPts val="0"/>
+              </a:spcAft>
+              <a:buNone/>
+            </a:pPr>
+            <a:r>
+              <a:t/>
+            </a:r>
+            <a:endParaRPr b="1" sz="4800">
+              <a:latin typeface="Lato"/>
+              <a:ea typeface="Lato"/>
+              <a:cs typeface="Lato"/>
+              <a:sym typeface="Lato"/>
+            </a:endParaRPr>
+          </a:p>
         </p:txBody>
       </p:sp>
     </p:spTree>
@@ -8985,11 +9462,6 @@
               <a:spcAft>
                 <a:spcPts val="0"/>
               </a:spcAft>
-              <a:buClr>
-                <a:srgbClr val="000000"/>
-              </a:buClr>
-              <a:buSzPts val="1100"/>
-              <a:buFont typeface="Arial"/>
               <a:buNone/>
             </a:pPr>
             <a:r>
@@ -9003,6 +9475,538 @@
       <p:sp>
         <p:nvSpPr>
           <p:cNvPr id="114" name="Google Shape;114;p17"/>
+          <p:cNvSpPr txBox="1"/>
+          <p:nvPr/>
+        </p:nvSpPr>
+        <p:spPr>
+          <a:xfrm>
+            <a:off x="5106400" y="2221463"/>
+            <a:ext cx="2982000" cy="2084700"/>
+          </a:xfrm>
+          <a:prstGeom prst="rect">
+            <a:avLst/>
+          </a:prstGeom>
+          <a:noFill/>
+          <a:ln>
+            <a:noFill/>
+          </a:ln>
+        </p:spPr>
+        <p:txBody>
+          <a:bodyPr anchorCtr="0" anchor="t" bIns="91425" lIns="91425" spcFirstLastPara="1" rIns="91425" wrap="square" tIns="91425">
+            <a:noAutofit/>
+          </a:bodyPr>
+          <a:lstStyle/>
+          <a:p>
+            <a:pPr indent="0" lvl="0" marL="0" rtl="0" algn="ctr">
+              <a:spcBef>
+                <a:spcPts val="0"/>
+              </a:spcBef>
+              <a:spcAft>
+                <a:spcPts val="0"/>
+              </a:spcAft>
+              <a:buNone/>
+            </a:pPr>
+            <a:r>
+              <a:rPr b="1" lang="en" sz="2400">
+                <a:latin typeface="Lato"/>
+                <a:ea typeface="Lato"/>
+                <a:cs typeface="Lato"/>
+                <a:sym typeface="Lato"/>
+              </a:rPr>
+              <a:t>Savings in License</a:t>
+            </a:r>
+            <a:endParaRPr b="1" sz="2400">
+              <a:latin typeface="Lato"/>
+              <a:ea typeface="Lato"/>
+              <a:cs typeface="Lato"/>
+              <a:sym typeface="Lato"/>
+            </a:endParaRPr>
+          </a:p>
+          <a:p>
+            <a:pPr indent="0" lvl="0" marL="0" rtl="0" algn="ctr">
+              <a:spcBef>
+                <a:spcPts val="0"/>
+              </a:spcBef>
+              <a:spcAft>
+                <a:spcPts val="0"/>
+              </a:spcAft>
+              <a:buNone/>
+            </a:pPr>
+            <a:r>
+              <a:rPr b="1" lang="en" sz="2400">
+                <a:latin typeface="Lato"/>
+                <a:ea typeface="Lato"/>
+                <a:cs typeface="Lato"/>
+                <a:sym typeface="Lato"/>
+              </a:rPr>
+              <a:t>Support Costs?</a:t>
+            </a:r>
+            <a:endParaRPr b="1" sz="2400">
+              <a:latin typeface="Lato"/>
+              <a:ea typeface="Lato"/>
+              <a:cs typeface="Lato"/>
+              <a:sym typeface="Lato"/>
+            </a:endParaRPr>
+          </a:p>
+          <a:p>
+            <a:pPr indent="0" lvl="0" marL="0" rtl="0" algn="ctr">
+              <a:spcBef>
+                <a:spcPts val="0"/>
+              </a:spcBef>
+              <a:spcAft>
+                <a:spcPts val="0"/>
+              </a:spcAft>
+              <a:buNone/>
+            </a:pPr>
+            <a:r>
+              <a:rPr b="1" lang="en" sz="3600">
+                <a:latin typeface="Lato"/>
+                <a:ea typeface="Lato"/>
+                <a:cs typeface="Lato"/>
+                <a:sym typeface="Lato"/>
+              </a:rPr>
+              <a:t>Up to 22%</a:t>
+            </a:r>
+            <a:endParaRPr b="1" sz="3600">
+              <a:latin typeface="Lato"/>
+              <a:ea typeface="Lato"/>
+              <a:cs typeface="Lato"/>
+              <a:sym typeface="Lato"/>
+            </a:endParaRPr>
+          </a:p>
+          <a:p>
+            <a:pPr indent="0" lvl="0" marL="0" rtl="0" algn="ctr">
+              <a:spcBef>
+                <a:spcPts val="0"/>
+              </a:spcBef>
+              <a:spcAft>
+                <a:spcPts val="0"/>
+              </a:spcAft>
+              <a:buNone/>
+            </a:pPr>
+            <a:r>
+              <a:t/>
+            </a:r>
+            <a:endParaRPr b="1" sz="4800">
+              <a:latin typeface="Lato"/>
+              <a:ea typeface="Lato"/>
+              <a:cs typeface="Lato"/>
+              <a:sym typeface="Lato"/>
+            </a:endParaRPr>
+          </a:p>
+          <a:p>
+            <a:pPr indent="0" lvl="0" marL="0" rtl="0" algn="ctr">
+              <a:spcBef>
+                <a:spcPts val="0"/>
+              </a:spcBef>
+              <a:spcAft>
+                <a:spcPts val="0"/>
+              </a:spcAft>
+              <a:buNone/>
+            </a:pPr>
+            <a:r>
+              <a:t/>
+            </a:r>
+            <a:endParaRPr b="1" sz="4800">
+              <a:latin typeface="Lato"/>
+              <a:ea typeface="Lato"/>
+              <a:cs typeface="Lato"/>
+              <a:sym typeface="Lato"/>
+            </a:endParaRPr>
+          </a:p>
+        </p:txBody>
+      </p:sp>
+      <p:sp>
+        <p:nvSpPr>
+          <p:cNvPr id="115" name="Google Shape;115;p17"/>
+          <p:cNvSpPr txBox="1"/>
+          <p:nvPr/>
+        </p:nvSpPr>
+        <p:spPr>
+          <a:xfrm>
+            <a:off x="1675750" y="1907675"/>
+            <a:ext cx="1973100" cy="2633100"/>
+          </a:xfrm>
+          <a:prstGeom prst="rect">
+            <a:avLst/>
+          </a:prstGeom>
+          <a:noFill/>
+          <a:ln>
+            <a:noFill/>
+          </a:ln>
+        </p:spPr>
+        <p:txBody>
+          <a:bodyPr anchorCtr="0" anchor="t" bIns="91425" lIns="91425" spcFirstLastPara="1" rIns="91425" wrap="square" tIns="91425">
+            <a:noAutofit/>
+          </a:bodyPr>
+          <a:lstStyle/>
+          <a:p>
+            <a:pPr indent="0" lvl="0" marL="0" rtl="0" algn="ctr">
+              <a:spcBef>
+                <a:spcPts val="0"/>
+              </a:spcBef>
+              <a:spcAft>
+                <a:spcPts val="0"/>
+              </a:spcAft>
+              <a:buNone/>
+            </a:pPr>
+            <a:r>
+              <a:rPr b="1" lang="en" sz="2400">
+                <a:latin typeface="Lato"/>
+                <a:ea typeface="Lato"/>
+                <a:cs typeface="Lato"/>
+                <a:sym typeface="Lato"/>
+              </a:rPr>
+              <a:t>Expected </a:t>
+            </a:r>
+            <a:endParaRPr b="1" sz="2400">
+              <a:latin typeface="Lato"/>
+              <a:ea typeface="Lato"/>
+              <a:cs typeface="Lato"/>
+              <a:sym typeface="Lato"/>
+            </a:endParaRPr>
+          </a:p>
+          <a:p>
+            <a:pPr indent="0" lvl="0" marL="0" rtl="0" algn="ctr">
+              <a:spcBef>
+                <a:spcPts val="0"/>
+              </a:spcBef>
+              <a:spcAft>
+                <a:spcPts val="0"/>
+              </a:spcAft>
+              <a:buNone/>
+            </a:pPr>
+            <a:r>
+              <a:rPr b="1" lang="en" sz="2400">
+                <a:latin typeface="Lato"/>
+                <a:ea typeface="Lato"/>
+                <a:cs typeface="Lato"/>
+                <a:sym typeface="Lato"/>
+              </a:rPr>
+              <a:t>Revenue</a:t>
+            </a:r>
+            <a:endParaRPr b="1" sz="2400">
+              <a:latin typeface="Lato"/>
+              <a:ea typeface="Lato"/>
+              <a:cs typeface="Lato"/>
+              <a:sym typeface="Lato"/>
+            </a:endParaRPr>
+          </a:p>
+          <a:p>
+            <a:pPr indent="0" lvl="0" marL="0" rtl="0" algn="ctr">
+              <a:spcBef>
+                <a:spcPts val="0"/>
+              </a:spcBef>
+              <a:spcAft>
+                <a:spcPts val="0"/>
+              </a:spcAft>
+              <a:buNone/>
+            </a:pPr>
+            <a:r>
+              <a:rPr b="1" lang="en" sz="2400">
+                <a:latin typeface="Lato"/>
+                <a:ea typeface="Lato"/>
+                <a:cs typeface="Lato"/>
+                <a:sym typeface="Lato"/>
+              </a:rPr>
+              <a:t>Increase:</a:t>
+            </a:r>
+            <a:endParaRPr b="1" sz="2400">
+              <a:latin typeface="Lato"/>
+              <a:ea typeface="Lato"/>
+              <a:cs typeface="Lato"/>
+              <a:sym typeface="Lato"/>
+            </a:endParaRPr>
+          </a:p>
+          <a:p>
+            <a:pPr indent="0" lvl="0" marL="0" rtl="0" algn="ctr">
+              <a:spcBef>
+                <a:spcPts val="0"/>
+              </a:spcBef>
+              <a:spcAft>
+                <a:spcPts val="0"/>
+              </a:spcAft>
+              <a:buNone/>
+            </a:pPr>
+            <a:r>
+              <a:rPr b="1" lang="en" sz="4800">
+                <a:latin typeface="Lato"/>
+                <a:ea typeface="Lato"/>
+                <a:cs typeface="Lato"/>
+                <a:sym typeface="Lato"/>
+              </a:rPr>
+              <a:t>18%</a:t>
+            </a:r>
+            <a:endParaRPr b="1" sz="4800">
+              <a:latin typeface="Lato"/>
+              <a:ea typeface="Lato"/>
+              <a:cs typeface="Lato"/>
+              <a:sym typeface="Lato"/>
+            </a:endParaRPr>
+          </a:p>
+          <a:p>
+            <a:pPr indent="0" lvl="0" marL="0" rtl="0" algn="ctr">
+              <a:spcBef>
+                <a:spcPts val="0"/>
+              </a:spcBef>
+              <a:spcAft>
+                <a:spcPts val="0"/>
+              </a:spcAft>
+              <a:buNone/>
+            </a:pPr>
+            <a:r>
+              <a:t/>
+            </a:r>
+            <a:endParaRPr b="1" sz="4800">
+              <a:latin typeface="Lato"/>
+              <a:ea typeface="Lato"/>
+              <a:cs typeface="Lato"/>
+              <a:sym typeface="Lato"/>
+            </a:endParaRPr>
+          </a:p>
+          <a:p>
+            <a:pPr indent="0" lvl="0" marL="0" rtl="0" algn="ctr">
+              <a:spcBef>
+                <a:spcPts val="0"/>
+              </a:spcBef>
+              <a:spcAft>
+                <a:spcPts val="0"/>
+              </a:spcAft>
+              <a:buNone/>
+            </a:pPr>
+            <a:r>
+              <a:t/>
+            </a:r>
+            <a:endParaRPr b="1" sz="4800">
+              <a:latin typeface="Lato"/>
+              <a:ea typeface="Lato"/>
+              <a:cs typeface="Lato"/>
+              <a:sym typeface="Lato"/>
+            </a:endParaRPr>
+          </a:p>
+        </p:txBody>
+      </p:sp>
+      <p:sp>
+        <p:nvSpPr>
+          <p:cNvPr id="116" name="Google Shape;116;p17"/>
+          <p:cNvSpPr txBox="1"/>
+          <p:nvPr/>
+        </p:nvSpPr>
+        <p:spPr>
+          <a:xfrm>
+            <a:off x="4156375" y="2329925"/>
+            <a:ext cx="1068900" cy="1449900"/>
+          </a:xfrm>
+          <a:prstGeom prst="rect">
+            <a:avLst/>
+          </a:prstGeom>
+          <a:noFill/>
+          <a:ln>
+            <a:noFill/>
+          </a:ln>
+        </p:spPr>
+        <p:txBody>
+          <a:bodyPr anchorCtr="0" anchor="t" bIns="91425" lIns="91425" spcFirstLastPara="1" rIns="91425" wrap="square" tIns="91425">
+            <a:noAutofit/>
+          </a:bodyPr>
+          <a:lstStyle/>
+          <a:p>
+            <a:pPr indent="0" lvl="0" marL="0" rtl="0" algn="l">
+              <a:spcBef>
+                <a:spcPts val="0"/>
+              </a:spcBef>
+              <a:spcAft>
+                <a:spcPts val="0"/>
+              </a:spcAft>
+              <a:buNone/>
+            </a:pPr>
+            <a:r>
+              <a:rPr lang="en" sz="7200">
+                <a:latin typeface="Lato"/>
+                <a:ea typeface="Lato"/>
+                <a:cs typeface="Lato"/>
+                <a:sym typeface="Lato"/>
+              </a:rPr>
+              <a:t>+</a:t>
+            </a:r>
+            <a:endParaRPr sz="7200">
+              <a:latin typeface="Lato"/>
+              <a:ea typeface="Lato"/>
+              <a:cs typeface="Lato"/>
+              <a:sym typeface="Lato"/>
+            </a:endParaRPr>
+          </a:p>
+        </p:txBody>
+      </p:sp>
+      <p:sp>
+        <p:nvSpPr>
+          <p:cNvPr id="117" name="Google Shape;117;p17"/>
+          <p:cNvSpPr/>
+          <p:nvPr/>
+        </p:nvSpPr>
+        <p:spPr>
+          <a:xfrm>
+            <a:off x="1675750" y="1762550"/>
+            <a:ext cx="1973100" cy="2309100"/>
+          </a:xfrm>
+          <a:prstGeom prst="roundRect">
+            <a:avLst>
+              <a:gd fmla="val 16667" name="adj"/>
+            </a:avLst>
+          </a:prstGeom>
+          <a:noFill/>
+          <a:ln cap="flat" cmpd="sng" w="38100">
+            <a:solidFill>
+              <a:schemeClr val="dk1"/>
+            </a:solidFill>
+            <a:prstDash val="solid"/>
+            <a:round/>
+            <a:headEnd len="sm" w="sm" type="none"/>
+            <a:tailEnd len="sm" w="sm" type="none"/>
+          </a:ln>
+        </p:spPr>
+        <p:txBody>
+          <a:bodyPr anchorCtr="0" anchor="ctr" bIns="91425" lIns="91425" spcFirstLastPara="1" rIns="91425" wrap="square" tIns="91425">
+            <a:noAutofit/>
+          </a:bodyPr>
+          <a:lstStyle/>
+          <a:p>
+            <a:pPr indent="0" lvl="0" marL="0" rtl="0" algn="l">
+              <a:spcBef>
+                <a:spcPts val="0"/>
+              </a:spcBef>
+              <a:spcAft>
+                <a:spcPts val="0"/>
+              </a:spcAft>
+              <a:buNone/>
+            </a:pPr>
+            <a:r>
+              <a:t/>
+            </a:r>
+            <a:endParaRPr/>
+          </a:p>
+        </p:txBody>
+      </p:sp>
+      <p:sp>
+        <p:nvSpPr>
+          <p:cNvPr id="118" name="Google Shape;118;p17"/>
+          <p:cNvSpPr/>
+          <p:nvPr/>
+        </p:nvSpPr>
+        <p:spPr>
+          <a:xfrm>
+            <a:off x="5159175" y="2142288"/>
+            <a:ext cx="2929200" cy="1608300"/>
+          </a:xfrm>
+          <a:prstGeom prst="rect">
+            <a:avLst/>
+          </a:prstGeom>
+          <a:noFill/>
+          <a:ln cap="flat" cmpd="sng" w="38100">
+            <a:solidFill>
+              <a:schemeClr val="accent3"/>
+            </a:solidFill>
+            <a:prstDash val="solid"/>
+            <a:round/>
+            <a:headEnd len="sm" w="sm" type="none"/>
+            <a:tailEnd len="sm" w="sm" type="none"/>
+          </a:ln>
+        </p:spPr>
+        <p:txBody>
+          <a:bodyPr anchorCtr="0" anchor="ctr" bIns="91425" lIns="91425" spcFirstLastPara="1" rIns="91425" wrap="square" tIns="91425">
+            <a:noAutofit/>
+          </a:bodyPr>
+          <a:lstStyle/>
+          <a:p>
+            <a:pPr indent="0" lvl="0" marL="0" rtl="0" algn="l">
+              <a:spcBef>
+                <a:spcPts val="0"/>
+              </a:spcBef>
+              <a:spcAft>
+                <a:spcPts val="0"/>
+              </a:spcAft>
+              <a:buNone/>
+            </a:pPr>
+            <a:r>
+              <a:t/>
+            </a:r>
+            <a:endParaRPr/>
+          </a:p>
+        </p:txBody>
+      </p:sp>
+    </p:spTree>
+  </p:cSld>
+  <p:clrMapOvr>
+    <a:masterClrMapping/>
+  </p:clrMapOvr>
+</p:sld>
+</file>
+
+<file path=ppt/slides/slide6.xml><?xml version="1.0" encoding="utf-8"?>
+<p:sld xmlns:a="http://schemas.openxmlformats.org/drawingml/2006/main" xmlns:r="http://schemas.openxmlformats.org/officeDocument/2006/relationships" xmlns:mc="http://schemas.openxmlformats.org/markup-compatibility/2006" xmlns:mv="urn:schemas-microsoft-com:mac:vml" xmlns:p="http://schemas.openxmlformats.org/presentationml/2006/main" xmlns:c="http://schemas.openxmlformats.org/drawingml/2006/chart" xmlns:dgm="http://schemas.openxmlformats.org/drawingml/2006/diagram" xmlns:o="urn:schemas-microsoft-com:office:office" xmlns:v="urn:schemas-microsoft-com:vml" xmlns:pvml="urn:schemas-microsoft-com:office:powerpoint" xmlns:com="http://schemas.openxmlformats.org/drawingml/2006/compatibility" xmlns:p14="http://schemas.microsoft.com/office/powerpoint/2010/main" xmlns:p15="http://schemas.microsoft.com/office/powerpoint/2012/main">
+  <p:cSld>
+    <p:spTree>
+      <p:nvGrpSpPr>
+        <p:cNvPr id="122" name="Shape 122"/>
+        <p:cNvGrpSpPr/>
+        <p:nvPr/>
+      </p:nvGrpSpPr>
+      <p:grpSpPr>
+        <a:xfrm>
+          <a:off x="0" y="0"/>
+          <a:ext cx="0" cy="0"/>
+          <a:chOff x="0" y="0"/>
+          <a:chExt cx="0" cy="0"/>
+        </a:xfrm>
+      </p:grpSpPr>
+      <p:sp>
+        <p:nvSpPr>
+          <p:cNvPr id="123" name="Google Shape;123;p18"/>
+          <p:cNvSpPr txBox="1"/>
+          <p:nvPr>
+            <p:ph type="title"/>
+          </p:nvPr>
+        </p:nvSpPr>
+        <p:spPr>
+          <a:xfrm>
+            <a:off x="729450" y="482650"/>
+            <a:ext cx="7688700" cy="1371000"/>
+          </a:xfrm>
+          <a:prstGeom prst="rect">
+            <a:avLst/>
+          </a:prstGeom>
+        </p:spPr>
+        <p:txBody>
+          <a:bodyPr anchorCtr="0" anchor="t" bIns="91425" lIns="91425" spcFirstLastPara="1" rIns="91425" wrap="square" tIns="91425">
+            <a:noAutofit/>
+          </a:bodyPr>
+          <a:lstStyle/>
+          <a:p>
+            <a:pPr indent="0" lvl="0" marL="0" rtl="0" algn="l">
+              <a:spcBef>
+                <a:spcPts val="0"/>
+              </a:spcBef>
+              <a:spcAft>
+                <a:spcPts val="0"/>
+              </a:spcAft>
+              <a:buClr>
+                <a:srgbClr val="000000"/>
+              </a:buClr>
+              <a:buSzPts val="1100"/>
+              <a:buFont typeface="Arial"/>
+              <a:buNone/>
+            </a:pPr>
+            <a:r>
+              <a:rPr lang="en" sz="3000"/>
+              <a:t>Recommendation: Increase Price to $59</a:t>
+            </a:r>
+            <a:endParaRPr sz="3000"/>
+          </a:p>
+        </p:txBody>
+      </p:sp>
+      <p:sp>
+        <p:nvSpPr>
+          <p:cNvPr id="124" name="Google Shape;124;p18"/>
           <p:cNvSpPr txBox="1"/>
           <p:nvPr/>
         </p:nvSpPr>
@@ -9095,12 +10099,12 @@
 </p:sld>
 </file>
 
-<file path=ppt/slides/slide6.xml><?xml version="1.0" encoding="utf-8"?>
+<file path=ppt/slides/slide7.xml><?xml version="1.0" encoding="utf-8"?>
 <p:sld xmlns:a="http://schemas.openxmlformats.org/drawingml/2006/main" xmlns:r="http://schemas.openxmlformats.org/officeDocument/2006/relationships" xmlns:mc="http://schemas.openxmlformats.org/markup-compatibility/2006" xmlns:mv="urn:schemas-microsoft-com:mac:vml" xmlns:p="http://schemas.openxmlformats.org/presentationml/2006/main" xmlns:c="http://schemas.openxmlformats.org/drawingml/2006/chart" xmlns:dgm="http://schemas.openxmlformats.org/drawingml/2006/diagram" xmlns:o="urn:schemas-microsoft-com:office:office" xmlns:v="urn:schemas-microsoft-com:vml" xmlns:pvml="urn:schemas-microsoft-com:office:powerpoint" xmlns:com="http://schemas.openxmlformats.org/drawingml/2006/compatibility" xmlns:p14="http://schemas.microsoft.com/office/powerpoint/2010/main" xmlns:p15="http://schemas.microsoft.com/office/powerpoint/2012/main">
   <p:cSld>
     <p:spTree>
       <p:nvGrpSpPr>
-        <p:cNvPr id="118" name="Shape 118"/>
+        <p:cNvPr id="128" name="Shape 128"/>
         <p:cNvGrpSpPr/>
         <p:nvPr/>
       </p:nvGrpSpPr>
@@ -9114,7 +10118,7 @@
       </p:grpSpPr>
       <p:sp>
         <p:nvSpPr>
-          <p:cNvPr id="119" name="Google Shape;119;p18"/>
+          <p:cNvPr id="129" name="Google Shape;129;p19"/>
           <p:cNvSpPr txBox="1"/>
           <p:nvPr>
             <p:ph type="title"/>
@@ -9154,7 +10158,7 @@
       </p:sp>
       <p:pic>
         <p:nvPicPr>
-          <p:cNvPr id="120" name="Google Shape;120;p18"/>
+          <p:cNvPr id="130" name="Google Shape;130;p19"/>
           <p:cNvPicPr preferRelativeResize="0"/>
           <p:nvPr/>
         </p:nvPicPr>
@@ -9181,7 +10185,7 @@
       </p:pic>
       <p:cxnSp>
         <p:nvCxnSpPr>
-          <p:cNvPr id="121" name="Google Shape;121;p18"/>
+          <p:cNvPr id="131" name="Google Shape;131;p19"/>
           <p:cNvCxnSpPr/>
           <p:nvPr/>
         </p:nvCxnSpPr>
@@ -9209,7 +10213,7 @@
       </p:cxnSp>
       <p:sp>
         <p:nvSpPr>
-          <p:cNvPr id="122" name="Google Shape;122;p18"/>
+          <p:cNvPr id="132" name="Google Shape;132;p19"/>
           <p:cNvSpPr txBox="1"/>
           <p:nvPr/>
         </p:nvSpPr>
@@ -9261,7 +10265,7 @@
       </p:sp>
       <p:sp>
         <p:nvSpPr>
-          <p:cNvPr id="123" name="Google Shape;123;p18"/>
+          <p:cNvPr id="133" name="Google Shape;133;p19"/>
           <p:cNvSpPr txBox="1"/>
           <p:nvPr/>
         </p:nvSpPr>
@@ -9391,12 +10395,12 @@
 </p:sld>
 </file>
 
-<file path=ppt/slides/slide7.xml><?xml version="1.0" encoding="utf-8"?>
+<file path=ppt/slides/slide8.xml><?xml version="1.0" encoding="utf-8"?>
 <p:sld xmlns:a="http://schemas.openxmlformats.org/drawingml/2006/main" xmlns:r="http://schemas.openxmlformats.org/officeDocument/2006/relationships" xmlns:mc="http://schemas.openxmlformats.org/markup-compatibility/2006" xmlns:mv="urn:schemas-microsoft-com:mac:vml" xmlns:p="http://schemas.openxmlformats.org/presentationml/2006/main" xmlns:c="http://schemas.openxmlformats.org/drawingml/2006/chart" xmlns:dgm="http://schemas.openxmlformats.org/drawingml/2006/diagram" xmlns:o="urn:schemas-microsoft-com:office:office" xmlns:v="urn:schemas-microsoft-com:vml" xmlns:pvml="urn:schemas-microsoft-com:office:powerpoint" xmlns:com="http://schemas.openxmlformats.org/drawingml/2006/compatibility" xmlns:p14="http://schemas.microsoft.com/office/powerpoint/2010/main" xmlns:p15="http://schemas.microsoft.com/office/powerpoint/2012/main">
   <p:cSld>
     <p:spTree>
       <p:nvGrpSpPr>
-        <p:cNvPr id="127" name="Shape 127"/>
+        <p:cNvPr id="137" name="Shape 137"/>
         <p:cNvGrpSpPr/>
         <p:nvPr/>
       </p:nvGrpSpPr>
@@ -9410,7 +10414,7 @@
       </p:grpSpPr>
       <p:sp>
         <p:nvSpPr>
-          <p:cNvPr id="128" name="Google Shape;128;p19"/>
+          <p:cNvPr id="138" name="Google Shape;138;p20"/>
           <p:cNvSpPr txBox="1"/>
           <p:nvPr>
             <p:ph type="title"/>
@@ -9450,7 +10454,7 @@
       </p:sp>
       <p:sp>
         <p:nvSpPr>
-          <p:cNvPr id="129" name="Google Shape;129;p19"/>
+          <p:cNvPr id="139" name="Google Shape;139;p20"/>
           <p:cNvSpPr txBox="1"/>
           <p:nvPr/>
         </p:nvSpPr>
@@ -9755,12 +10759,12 @@
 </p:sld>
 </file>
 
-<file path=ppt/slides/slide8.xml><?xml version="1.0" encoding="utf-8"?>
+<file path=ppt/slides/slide9.xml><?xml version="1.0" encoding="utf-8"?>
 <p:sld xmlns:a="http://schemas.openxmlformats.org/drawingml/2006/main" xmlns:r="http://schemas.openxmlformats.org/officeDocument/2006/relationships" xmlns:mc="http://schemas.openxmlformats.org/markup-compatibility/2006" xmlns:mv="urn:schemas-microsoft-com:mac:vml" xmlns:p="http://schemas.openxmlformats.org/presentationml/2006/main" xmlns:c="http://schemas.openxmlformats.org/drawingml/2006/chart" xmlns:dgm="http://schemas.openxmlformats.org/drawingml/2006/diagram" xmlns:o="urn:schemas-microsoft-com:office:office" xmlns:v="urn:schemas-microsoft-com:vml" xmlns:pvml="urn:schemas-microsoft-com:office:powerpoint" xmlns:com="http://schemas.openxmlformats.org/drawingml/2006/compatibility" xmlns:p14="http://schemas.microsoft.com/office/powerpoint/2010/main" xmlns:p15="http://schemas.microsoft.com/office/powerpoint/2012/main">
   <p:cSld>
     <p:spTree>
       <p:nvGrpSpPr>
-        <p:cNvPr id="133" name="Shape 133"/>
+        <p:cNvPr id="143" name="Shape 143"/>
         <p:cNvGrpSpPr/>
         <p:nvPr/>
       </p:nvGrpSpPr>
@@ -9774,7 +10778,7 @@
       </p:grpSpPr>
       <p:sp>
         <p:nvSpPr>
-          <p:cNvPr id="134" name="Google Shape;134;p20"/>
+          <p:cNvPr id="144" name="Google Shape;144;p21"/>
           <p:cNvSpPr txBox="1"/>
           <p:nvPr>
             <p:ph type="title"/>
@@ -9814,7 +10818,7 @@
       </p:sp>
       <p:pic>
         <p:nvPicPr>
-          <p:cNvPr id="135" name="Google Shape;135;p20"/>
+          <p:cNvPr id="145" name="Google Shape;145;p21"/>
           <p:cNvPicPr preferRelativeResize="0"/>
           <p:nvPr/>
         </p:nvPicPr>
@@ -9847,344 +10851,286 @@
 </p:sld>
 </file>
 
-<file path=ppt/slides/slide9.xml><?xml version="1.0" encoding="utf-8"?>
-<p:sld xmlns:a="http://schemas.openxmlformats.org/drawingml/2006/main" xmlns:r="http://schemas.openxmlformats.org/officeDocument/2006/relationships" xmlns:mc="http://schemas.openxmlformats.org/markup-compatibility/2006" xmlns:mv="urn:schemas-microsoft-com:mac:vml" xmlns:p="http://schemas.openxmlformats.org/presentationml/2006/main" xmlns:c="http://schemas.openxmlformats.org/drawingml/2006/chart" xmlns:dgm="http://schemas.openxmlformats.org/drawingml/2006/diagram" xmlns:o="urn:schemas-microsoft-com:office:office" xmlns:v="urn:schemas-microsoft-com:vml" xmlns:pvml="urn:schemas-microsoft-com:office:powerpoint" xmlns:com="http://schemas.openxmlformats.org/drawingml/2006/compatibility" xmlns:p14="http://schemas.microsoft.com/office/powerpoint/2010/main" xmlns:p15="http://schemas.microsoft.com/office/powerpoint/2012/main">
-  <p:cSld>
-    <p:spTree>
-      <p:nvGrpSpPr>
-        <p:cNvPr id="139" name="Shape 139"/>
-        <p:cNvGrpSpPr/>
-        <p:nvPr/>
-      </p:nvGrpSpPr>
-      <p:grpSpPr>
-        <a:xfrm>
-          <a:off x="0" y="0"/>
-          <a:ext cx="0" cy="0"/>
-          <a:chOff x="0" y="0"/>
-          <a:chExt cx="0" cy="0"/>
-        </a:xfrm>
-      </p:grpSpPr>
-      <p:sp>
-        <p:nvSpPr>
-          <p:cNvPr id="140" name="Google Shape;140;p21"/>
-          <p:cNvSpPr txBox="1"/>
-          <p:nvPr>
-            <p:ph type="title"/>
-          </p:nvPr>
-        </p:nvSpPr>
-        <p:spPr>
-          <a:xfrm>
-            <a:off x="729450" y="482650"/>
-            <a:ext cx="7688700" cy="1371000"/>
-          </a:xfrm>
-          <a:prstGeom prst="rect">
-            <a:avLst/>
-          </a:prstGeom>
-        </p:spPr>
-        <p:txBody>
-          <a:bodyPr anchorCtr="0" anchor="t" bIns="91425" lIns="91425" spcFirstLastPara="1" rIns="91425" wrap="square" tIns="91425">
-            <a:noAutofit/>
-          </a:bodyPr>
-          <a:lstStyle/>
-          <a:p>
-            <a:pPr indent="0" lvl="0" marL="0" rtl="0" algn="l">
-              <a:spcBef>
-                <a:spcPts val="0"/>
-              </a:spcBef>
-              <a:spcAft>
-                <a:spcPts val="0"/>
-              </a:spcAft>
-              <a:buNone/>
-            </a:pPr>
-            <a:r>
-              <a:rPr lang="en" sz="3000"/>
-              <a:t>Revenue varies by Traffic Source:</a:t>
-            </a:r>
-            <a:endParaRPr sz="3000"/>
-          </a:p>
-        </p:txBody>
-      </p:sp>
-      <p:sp>
-        <p:nvSpPr>
-          <p:cNvPr id="141" name="Google Shape;141;p21"/>
-          <p:cNvSpPr txBox="1"/>
-          <p:nvPr/>
-        </p:nvSpPr>
-        <p:spPr>
-          <a:xfrm>
-            <a:off x="620150" y="1649350"/>
-            <a:ext cx="8418300" cy="2949900"/>
-          </a:xfrm>
-          <a:prstGeom prst="rect">
-            <a:avLst/>
-          </a:prstGeom>
-          <a:noFill/>
-          <a:ln>
-            <a:noFill/>
-          </a:ln>
-        </p:spPr>
-        <p:txBody>
-          <a:bodyPr anchorCtr="0" anchor="t" bIns="91425" lIns="91425" spcFirstLastPara="1" rIns="91425" wrap="square" tIns="91425">
-            <a:noAutofit/>
-          </a:bodyPr>
-          <a:lstStyle/>
-          <a:p>
-            <a:pPr indent="0" lvl="0" marL="0" rtl="0" algn="l">
-              <a:lnSpc>
-                <a:spcPct val="115000"/>
-              </a:lnSpc>
-              <a:spcBef>
-                <a:spcPts val="0"/>
-              </a:spcBef>
-              <a:spcAft>
-                <a:spcPts val="0"/>
-              </a:spcAft>
-              <a:buNone/>
-            </a:pPr>
-            <a:r>
-              <a:rPr lang="en" sz="2400">
-                <a:latin typeface="Lato"/>
-                <a:ea typeface="Lato"/>
-                <a:cs typeface="Lato"/>
-                <a:sym typeface="Lato"/>
-              </a:rPr>
-              <a:t>Margin (</a:t>
-            </a:r>
-            <a:r>
-              <a:rPr i="1" lang="en" sz="2400">
-                <a:latin typeface="Lato"/>
-                <a:ea typeface="Lato"/>
-                <a:cs typeface="Lato"/>
-                <a:sym typeface="Lato"/>
-              </a:rPr>
-              <a:t>Google</a:t>
-            </a:r>
-            <a:r>
-              <a:rPr lang="en" sz="2400">
-                <a:latin typeface="Lato"/>
-                <a:ea typeface="Lato"/>
-                <a:cs typeface="Lato"/>
-                <a:sym typeface="Lato"/>
-              </a:rPr>
-              <a:t>) =</a:t>
-            </a:r>
-            <a:endParaRPr sz="2400">
-              <a:latin typeface="Lato"/>
-              <a:ea typeface="Lato"/>
-              <a:cs typeface="Lato"/>
-              <a:sym typeface="Lato"/>
-            </a:endParaRPr>
-          </a:p>
-          <a:p>
-            <a:pPr indent="457200" lvl="0" marL="0" rtl="0" algn="l">
-              <a:lnSpc>
-                <a:spcPct val="115000"/>
-              </a:lnSpc>
-              <a:spcBef>
-                <a:spcPts val="0"/>
-              </a:spcBef>
-              <a:spcAft>
-                <a:spcPts val="0"/>
-              </a:spcAft>
-              <a:buNone/>
-            </a:pPr>
-            <a:r>
-              <a:rPr lang="en" sz="2400">
-                <a:latin typeface="Lato"/>
-                <a:ea typeface="Lato"/>
-                <a:cs typeface="Lato"/>
-                <a:sym typeface="Lato"/>
-              </a:rPr>
-              <a:t>Revenue-per-click-through(</a:t>
-            </a:r>
-            <a:r>
-              <a:rPr i="1" lang="en" sz="2400">
-                <a:latin typeface="Lato"/>
-                <a:ea typeface="Lato"/>
-                <a:cs typeface="Lato"/>
-                <a:sym typeface="Lato"/>
-              </a:rPr>
-              <a:t>Google</a:t>
-            </a:r>
-            <a:r>
-              <a:rPr lang="en" sz="2400">
-                <a:latin typeface="Lato"/>
-                <a:ea typeface="Lato"/>
-                <a:cs typeface="Lato"/>
-                <a:sym typeface="Lato"/>
-              </a:rPr>
-              <a:t>) - </a:t>
-            </a:r>
-            <a:endParaRPr sz="2400">
-              <a:latin typeface="Lato"/>
-              <a:ea typeface="Lato"/>
-              <a:cs typeface="Lato"/>
-              <a:sym typeface="Lato"/>
-            </a:endParaRPr>
-          </a:p>
-          <a:p>
-            <a:pPr indent="457200" lvl="0" marL="457200" rtl="0" algn="l">
-              <a:lnSpc>
-                <a:spcPct val="115000"/>
-              </a:lnSpc>
-              <a:spcBef>
-                <a:spcPts val="0"/>
-              </a:spcBef>
-              <a:spcAft>
-                <a:spcPts val="0"/>
-              </a:spcAft>
-              <a:buNone/>
-            </a:pPr>
-            <a:r>
-              <a:rPr lang="en" sz="2400">
-                <a:latin typeface="Lato"/>
-                <a:ea typeface="Lato"/>
-                <a:cs typeface="Lato"/>
-                <a:sym typeface="Lato"/>
-              </a:rPr>
-              <a:t>					Cost-per-click-through(</a:t>
-            </a:r>
-            <a:r>
-              <a:rPr i="1" lang="en" sz="2400">
-                <a:latin typeface="Lato"/>
-                <a:ea typeface="Lato"/>
-                <a:cs typeface="Lato"/>
-                <a:sym typeface="Lato"/>
-              </a:rPr>
-              <a:t>Google</a:t>
-            </a:r>
-            <a:r>
-              <a:rPr lang="en" sz="2400">
-                <a:latin typeface="Lato"/>
-                <a:ea typeface="Lato"/>
-                <a:cs typeface="Lato"/>
-                <a:sym typeface="Lato"/>
-              </a:rPr>
-              <a:t>)</a:t>
-            </a:r>
-            <a:endParaRPr sz="2400">
-              <a:latin typeface="Lato"/>
-              <a:ea typeface="Lato"/>
-              <a:cs typeface="Lato"/>
-              <a:sym typeface="Lato"/>
-            </a:endParaRPr>
-          </a:p>
-          <a:p>
-            <a:pPr indent="457200" lvl="0" marL="457200" rtl="0" algn="l">
-              <a:lnSpc>
-                <a:spcPct val="115000"/>
-              </a:lnSpc>
-              <a:spcBef>
-                <a:spcPts val="0"/>
-              </a:spcBef>
-              <a:spcAft>
-                <a:spcPts val="0"/>
-              </a:spcAft>
-              <a:buNone/>
-            </a:pPr>
-            <a:r>
-              <a:t/>
-            </a:r>
-            <a:endParaRPr sz="2400">
-              <a:latin typeface="Lato"/>
-              <a:ea typeface="Lato"/>
-              <a:cs typeface="Lato"/>
-              <a:sym typeface="Lato"/>
-            </a:endParaRPr>
-          </a:p>
-          <a:p>
-            <a:pPr indent="457200" lvl="0" marL="457200" rtl="0" algn="l">
-              <a:lnSpc>
-                <a:spcPct val="115000"/>
-              </a:lnSpc>
-              <a:spcBef>
-                <a:spcPts val="0"/>
-              </a:spcBef>
-              <a:spcAft>
-                <a:spcPts val="0"/>
-              </a:spcAft>
-              <a:buNone/>
-            </a:pPr>
-            <a:r>
-              <a:t/>
-            </a:r>
-            <a:endParaRPr sz="2400">
-              <a:latin typeface="Lato"/>
-              <a:ea typeface="Lato"/>
-              <a:cs typeface="Lato"/>
-              <a:sym typeface="Lato"/>
-            </a:endParaRPr>
-          </a:p>
-          <a:p>
-            <a:pPr indent="457200" lvl="0" marL="0" rtl="0" algn="l">
-              <a:lnSpc>
-                <a:spcPct val="115000"/>
-              </a:lnSpc>
-              <a:spcBef>
-                <a:spcPts val="0"/>
-              </a:spcBef>
-              <a:spcAft>
-                <a:spcPts val="0"/>
-              </a:spcAft>
-              <a:buNone/>
-            </a:pPr>
-            <a:r>
-              <a:rPr b="1" lang="en" sz="2400">
-                <a:solidFill>
-                  <a:srgbClr val="0000FF"/>
-                </a:solidFill>
-                <a:latin typeface="Lato"/>
-                <a:ea typeface="Lato"/>
-                <a:cs typeface="Lato"/>
-                <a:sym typeface="Lato"/>
-              </a:rPr>
-              <a:t>Shift budget towards H</a:t>
-            </a:r>
-            <a:r>
-              <a:rPr b="1" lang="en" sz="2400">
-                <a:solidFill>
-                  <a:srgbClr val="0000FF"/>
-                </a:solidFill>
-                <a:latin typeface="Lato"/>
-                <a:ea typeface="Lato"/>
-                <a:cs typeface="Lato"/>
-                <a:sym typeface="Lato"/>
-              </a:rPr>
-              <a:t>ighest-Margin</a:t>
-            </a:r>
-            <a:r>
-              <a:rPr b="1" lang="en" sz="2400">
-                <a:solidFill>
-                  <a:srgbClr val="0000FF"/>
-                </a:solidFill>
-                <a:latin typeface="Lato"/>
-                <a:ea typeface="Lato"/>
-                <a:cs typeface="Lato"/>
-                <a:sym typeface="Lato"/>
-              </a:rPr>
-              <a:t> browsers</a:t>
-            </a:r>
-            <a:endParaRPr b="1" sz="2400">
-              <a:solidFill>
-                <a:srgbClr val="0000FF"/>
-              </a:solidFill>
-              <a:latin typeface="Lato"/>
-              <a:ea typeface="Lato"/>
-              <a:cs typeface="Lato"/>
-              <a:sym typeface="Lato"/>
-            </a:endParaRPr>
-          </a:p>
-        </p:txBody>
-      </p:sp>
-    </p:spTree>
-  </p:cSld>
-  <p:clrMapOvr>
-    <a:masterClrMapping/>
-  </p:clrMapOvr>
-</p:sld>
+<file path=ppt/theme/theme1.xml><?xml version="1.0" encoding="utf-8"?>
+<a:theme xmlns:a="http://schemas.openxmlformats.org/drawingml/2006/main" xmlns:r="http://schemas.openxmlformats.org/officeDocument/2006/relationships" name="Streamline">
+  <a:themeElements>
+    <a:clrScheme name="Streamline">
+      <a:dk1>
+        <a:srgbClr val="1A9988"/>
+      </a:dk1>
+      <a:lt1>
+        <a:srgbClr val="FFFFFF"/>
+      </a:lt1>
+      <a:dk2>
+        <a:srgbClr val="1A1A1A"/>
+      </a:dk2>
+      <a:lt2>
+        <a:srgbClr val="E9EDEE"/>
+      </a:lt2>
+      <a:accent1>
+        <a:srgbClr val="595959"/>
+      </a:accent1>
+      <a:accent2>
+        <a:srgbClr val="6AA4C8"/>
+      </a:accent2>
+      <a:accent3>
+        <a:srgbClr val="EB5600"/>
+      </a:accent3>
+      <a:accent4>
+        <a:srgbClr val="A2FFE8"/>
+      </a:accent4>
+      <a:accent5>
+        <a:srgbClr val="1C3678"/>
+      </a:accent5>
+      <a:accent6>
+        <a:srgbClr val="FFB8A2"/>
+      </a:accent6>
+      <a:hlink>
+        <a:srgbClr val="1C3678"/>
+      </a:hlink>
+      <a:folHlink>
+        <a:srgbClr val="1C3678"/>
+      </a:folHlink>
+    </a:clrScheme>
+    <a:fontScheme name="Office">
+      <a:majorFont>
+        <a:latin typeface="Arial"/>
+        <a:ea typeface=""/>
+        <a:cs typeface=""/>
+        <a:font script="Jpan" typeface="ＭＳ Ｐゴシック"/>
+        <a:font script="Hang" typeface="맑은 고딕"/>
+        <a:font script="Hans" typeface="宋体"/>
+        <a:font script="Hant" typeface="新細明體"/>
+        <a:font script="Arab" typeface="Times New Roman"/>
+        <a:font script="Hebr" typeface="Times New Roman"/>
+        <a:font script="Thai" typeface="Angsana New"/>
+        <a:font script="Ethi" typeface="Nyala"/>
+        <a:font script="Beng" typeface="Vrinda"/>
+        <a:font script="Gujr" typeface="Shruti"/>
+        <a:font script="Khmr" typeface="MoolBoran"/>
+        <a:font script="Knda" typeface="Tunga"/>
+        <a:font script="Guru" typeface="Raavi"/>
+        <a:font script="Cans" typeface="Euphemia"/>
+        <a:font script="Cher" typeface="Plantagenet Cherokee"/>
+        <a:font script="Yiii" typeface="Microsoft Yi Baiti"/>
+        <a:font script="Tibt" typeface="Microsoft Himalaya"/>
+        <a:font script="Thaa" typeface="MV Boli"/>
+        <a:font script="Deva" typeface="Mangal"/>
+        <a:font script="Telu" typeface="Gautami"/>
+        <a:font script="Taml" typeface="Latha"/>
+        <a:font script="Syrc" typeface="Estrangelo Edessa"/>
+        <a:font script="Orya" typeface="Kalinga"/>
+        <a:font script="Mlym" typeface="Kartika"/>
+        <a:font script="Laoo" typeface="DokChampa"/>
+        <a:font script="Sinh" typeface="Iskoola Pota"/>
+        <a:font script="Mong" typeface="Mongolian Baiti"/>
+        <a:font script="Viet" typeface="Times New Roman"/>
+        <a:font script="Uigh" typeface="Microsoft Uighur"/>
+        <a:font script="Geor" typeface="Sylfaen"/>
+      </a:majorFont>
+      <a:minorFont>
+        <a:latin typeface="Arial"/>
+        <a:ea typeface=""/>
+        <a:cs typeface=""/>
+        <a:font script="Jpan" typeface="ＭＳ Ｐゴシック"/>
+        <a:font script="Hang" typeface="맑은 고딕"/>
+        <a:font script="Hans" typeface="宋体"/>
+        <a:font script="Hant" typeface="新細明體"/>
+        <a:font script="Arab" typeface="Arial"/>
+        <a:font script="Hebr" typeface="Arial"/>
+        <a:font script="Thai" typeface="Cordia New"/>
+        <a:font script="Ethi" typeface="Nyala"/>
+        <a:font script="Beng" typeface="Vrinda"/>
+        <a:font script="Gujr" typeface="Shruti"/>
+        <a:font script="Khmr" typeface="DaunPenh"/>
+        <a:font script="Knda" typeface="Tunga"/>
+        <a:font script="Guru" typeface="Raavi"/>
+        <a:font script="Cans" typeface="Euphemia"/>
+        <a:font script="Cher" typeface="Plantagenet Cherokee"/>
+        <a:font script="Yiii" typeface="Microsoft Yi Baiti"/>
+        <a:font script="Tibt" typeface="Microsoft Himalaya"/>
+        <a:font script="Thaa" typeface="MV Boli"/>
+        <a:font script="Deva" typeface="Mangal"/>
+        <a:font script="Telu" typeface="Gautami"/>
+        <a:font script="Taml" typeface="Latha"/>
+        <a:font script="Syrc" typeface="Estrangelo Edessa"/>
+        <a:font script="Orya" typeface="Kalinga"/>
+        <a:font script="Mlym" typeface="Kartika"/>
+        <a:font script="Laoo" typeface="DokChampa"/>
+        <a:font script="Sinh" typeface="Iskoola Pota"/>
+        <a:font script="Mong" typeface="Mongolian Baiti"/>
+        <a:font script="Viet" typeface="Arial"/>
+        <a:font script="Uigh" typeface="Microsoft Uighur"/>
+        <a:font script="Geor" typeface="Sylfaen"/>
+      </a:minorFont>
+    </a:fontScheme>
+    <a:fmtScheme name="Office">
+      <a:fillStyleLst>
+        <a:solidFill>
+          <a:schemeClr val="phClr"/>
+        </a:solidFill>
+        <a:gradFill rotWithShape="1">
+          <a:gsLst>
+            <a:gs pos="0">
+              <a:schemeClr val="phClr">
+                <a:tint val="50000"/>
+                <a:satMod val="300000"/>
+              </a:schemeClr>
+            </a:gs>
+            <a:gs pos="35000">
+              <a:schemeClr val="phClr">
+                <a:tint val="37000"/>
+                <a:satMod val="300000"/>
+              </a:schemeClr>
+            </a:gs>
+            <a:gs pos="100000">
+              <a:schemeClr val="phClr">
+                <a:tint val="15000"/>
+                <a:satMod val="350000"/>
+              </a:schemeClr>
+            </a:gs>
+          </a:gsLst>
+          <a:lin ang="16200000" scaled="1"/>
+        </a:gradFill>
+        <a:gradFill rotWithShape="1">
+          <a:gsLst>
+            <a:gs pos="0">
+              <a:schemeClr val="phClr">
+                <a:tint val="100000"/>
+                <a:shade val="100000"/>
+                <a:satMod val="130000"/>
+              </a:schemeClr>
+            </a:gs>
+            <a:gs pos="100000">
+              <a:schemeClr val="phClr">
+                <a:tint val="50000"/>
+                <a:shade val="100000"/>
+                <a:satMod val="350000"/>
+              </a:schemeClr>
+            </a:gs>
+          </a:gsLst>
+          <a:lin ang="16200000" scaled="0"/>
+        </a:gradFill>
+      </a:fillStyleLst>
+      <a:lnStyleLst>
+        <a:ln w="9525" cap="flat" cmpd="sng" algn="ctr">
+          <a:solidFill>
+            <a:schemeClr val="phClr">
+              <a:shade val="95000"/>
+              <a:satMod val="105000"/>
+            </a:schemeClr>
+          </a:solidFill>
+          <a:prstDash val="solid"/>
+        </a:ln>
+        <a:ln w="25400" cap="flat" cmpd="sng" algn="ctr">
+          <a:solidFill>
+            <a:schemeClr val="phClr"/>
+          </a:solidFill>
+          <a:prstDash val="solid"/>
+        </a:ln>
+        <a:ln w="38100" cap="flat" cmpd="sng" algn="ctr">
+          <a:solidFill>
+            <a:schemeClr val="phClr"/>
+          </a:solidFill>
+          <a:prstDash val="solid"/>
+        </a:ln>
+      </a:lnStyleLst>
+      <a:effectStyleLst>
+        <a:effectStyle>
+          <a:effectLst>
+            <a:outerShdw blurRad="40000" dist="20000" dir="5400000" rotWithShape="0">
+              <a:srgbClr val="000000">
+                <a:alpha val="38000"/>
+              </a:srgbClr>
+            </a:outerShdw>
+          </a:effectLst>
+        </a:effectStyle>
+        <a:effectStyle>
+          <a:effectLst>
+            <a:outerShdw blurRad="40000" dist="23000" dir="5400000" rotWithShape="0">
+              <a:srgbClr val="000000">
+                <a:alpha val="35000"/>
+              </a:srgbClr>
+            </a:outerShdw>
+          </a:effectLst>
+        </a:effectStyle>
+        <a:effectStyle>
+          <a:effectLst>
+            <a:outerShdw blurRad="40000" dist="23000" dir="5400000" rotWithShape="0">
+              <a:srgbClr val="000000">
+                <a:alpha val="35000"/>
+              </a:srgbClr>
+            </a:outerShdw>
+          </a:effectLst>
+          <a:scene3d>
+            <a:camera prst="orthographicFront">
+              <a:rot lat="0" lon="0" rev="0"/>
+            </a:camera>
+            <a:lightRig rig="threePt" dir="t">
+              <a:rot lat="0" lon="0" rev="1200000"/>
+            </a:lightRig>
+          </a:scene3d>
+          <a:sp3d>
+            <a:bevelT w="63500" h="25400"/>
+          </a:sp3d>
+        </a:effectStyle>
+      </a:effectStyleLst>
+      <a:bgFillStyleLst>
+        <a:solidFill>
+          <a:schemeClr val="phClr"/>
+        </a:solidFill>
+        <a:gradFill rotWithShape="1">
+          <a:gsLst>
+            <a:gs pos="0">
+              <a:schemeClr val="phClr">
+                <a:tint val="40000"/>
+                <a:satMod val="350000"/>
+              </a:schemeClr>
+            </a:gs>
+            <a:gs pos="40000">
+              <a:schemeClr val="phClr">
+                <a:tint val="45000"/>
+                <a:shade val="99000"/>
+                <a:satMod val="350000"/>
+              </a:schemeClr>
+            </a:gs>
+            <a:gs pos="100000">
+              <a:schemeClr val="phClr">
+                <a:shade val="20000"/>
+                <a:satMod val="255000"/>
+              </a:schemeClr>
+            </a:gs>
+          </a:gsLst>
+          <a:path path="circle">
+            <a:fillToRect l="50000" t="-80000" r="50000" b="180000"/>
+          </a:path>
+        </a:gradFill>
+        <a:gradFill rotWithShape="1">
+          <a:gsLst>
+            <a:gs pos="0">
+              <a:schemeClr val="phClr">
+                <a:tint val="80000"/>
+                <a:satMod val="300000"/>
+              </a:schemeClr>
+            </a:gs>
+            <a:gs pos="100000">
+              <a:schemeClr val="phClr">
+                <a:shade val="30000"/>
+                <a:satMod val="200000"/>
+              </a:schemeClr>
+            </a:gs>
+          </a:gsLst>
+          <a:path path="circle">
+            <a:fillToRect l="50000" t="50000" r="50000" b="50000"/>
+          </a:path>
+        </a:gradFill>
+      </a:bgFillStyleLst>
+    </a:fmtScheme>
+  </a:themeElements>
+</a:theme>
 </file>
 
-<file path=ppt/theme/theme1.xml><?xml version="1.0" encoding="utf-8"?>
+<file path=ppt/theme/theme2.xml><?xml version="1.0" encoding="utf-8"?>
 <a:theme xmlns:a="http://schemas.openxmlformats.org/drawingml/2006/main" xmlns:r="http://schemas.openxmlformats.org/officeDocument/2006/relationships">
   <a:themeElements>
     <a:clrScheme name="Default">
@@ -10461,283 +11407,4 @@
     </a:fmtScheme>
   </a:themeElements>
 </a:theme>
-</file>
-
-<file path=ppt/theme/theme2.xml><?xml version="1.0" encoding="utf-8"?>
-<a:theme xmlns:a="http://schemas.openxmlformats.org/drawingml/2006/main" xmlns:r="http://schemas.openxmlformats.org/officeDocument/2006/relationships" name="Streamline">
-  <a:themeElements>
-    <a:clrScheme name="Streamline">
-      <a:dk1>
-        <a:srgbClr val="1A9988"/>
-      </a:dk1>
-      <a:lt1>
-        <a:srgbClr val="FFFFFF"/>
-      </a:lt1>
-      <a:dk2>
-        <a:srgbClr val="1A1A1A"/>
-      </a:dk2>
-      <a:lt2>
-        <a:srgbClr val="E9EDEE"/>
-      </a:lt2>
-      <a:accent1>
-        <a:srgbClr val="595959"/>
-      </a:accent1>
-      <a:accent2>
-        <a:srgbClr val="6AA4C8"/>
-      </a:accent2>
-      <a:accent3>
-        <a:srgbClr val="EB5600"/>
-      </a:accent3>
-      <a:accent4>
-        <a:srgbClr val="A2FFE8"/>
-      </a:accent4>
-      <a:accent5>
-        <a:srgbClr val="1C3678"/>
-      </a:accent5>
-      <a:accent6>
-        <a:srgbClr val="FFB8A2"/>
-      </a:accent6>
-      <a:hlink>
-        <a:srgbClr val="1C3678"/>
-      </a:hlink>
-      <a:folHlink>
-        <a:srgbClr val="1C3678"/>
-      </a:folHlink>
-    </a:clrScheme>
-    <a:fontScheme name="Office">
-      <a:majorFont>
-        <a:latin typeface="Arial"/>
-        <a:ea typeface=""/>
-        <a:cs typeface=""/>
-        <a:font script="Jpan" typeface="ＭＳ Ｐゴシック"/>
-        <a:font script="Hang" typeface="맑은 고딕"/>
-        <a:font script="Hans" typeface="宋体"/>
-        <a:font script="Hant" typeface="新細明體"/>
-        <a:font script="Arab" typeface="Times New Roman"/>
-        <a:font script="Hebr" typeface="Times New Roman"/>
-        <a:font script="Thai" typeface="Angsana New"/>
-        <a:font script="Ethi" typeface="Nyala"/>
-        <a:font script="Beng" typeface="Vrinda"/>
-        <a:font script="Gujr" typeface="Shruti"/>
-        <a:font script="Khmr" typeface="MoolBoran"/>
-        <a:font script="Knda" typeface="Tunga"/>
-        <a:font script="Guru" typeface="Raavi"/>
-        <a:font script="Cans" typeface="Euphemia"/>
-        <a:font script="Cher" typeface="Plantagenet Cherokee"/>
-        <a:font script="Yiii" typeface="Microsoft Yi Baiti"/>
-        <a:font script="Tibt" typeface="Microsoft Himalaya"/>
-        <a:font script="Thaa" typeface="MV Boli"/>
-        <a:font script="Deva" typeface="Mangal"/>
-        <a:font script="Telu" typeface="Gautami"/>
-        <a:font script="Taml" typeface="Latha"/>
-        <a:font script="Syrc" typeface="Estrangelo Edessa"/>
-        <a:font script="Orya" typeface="Kalinga"/>
-        <a:font script="Mlym" typeface="Kartika"/>
-        <a:font script="Laoo" typeface="DokChampa"/>
-        <a:font script="Sinh" typeface="Iskoola Pota"/>
-        <a:font script="Mong" typeface="Mongolian Baiti"/>
-        <a:font script="Viet" typeface="Times New Roman"/>
-        <a:font script="Uigh" typeface="Microsoft Uighur"/>
-        <a:font script="Geor" typeface="Sylfaen"/>
-      </a:majorFont>
-      <a:minorFont>
-        <a:latin typeface="Arial"/>
-        <a:ea typeface=""/>
-        <a:cs typeface=""/>
-        <a:font script="Jpan" typeface="ＭＳ Ｐゴシック"/>
-        <a:font script="Hang" typeface="맑은 고딕"/>
-        <a:font script="Hans" typeface="宋体"/>
-        <a:font script="Hant" typeface="新細明體"/>
-        <a:font script="Arab" typeface="Arial"/>
-        <a:font script="Hebr" typeface="Arial"/>
-        <a:font script="Thai" typeface="Cordia New"/>
-        <a:font script="Ethi" typeface="Nyala"/>
-        <a:font script="Beng" typeface="Vrinda"/>
-        <a:font script="Gujr" typeface="Shruti"/>
-        <a:font script="Khmr" typeface="DaunPenh"/>
-        <a:font script="Knda" typeface="Tunga"/>
-        <a:font script="Guru" typeface="Raavi"/>
-        <a:font script="Cans" typeface="Euphemia"/>
-        <a:font script="Cher" typeface="Plantagenet Cherokee"/>
-        <a:font script="Yiii" typeface="Microsoft Yi Baiti"/>
-        <a:font script="Tibt" typeface="Microsoft Himalaya"/>
-        <a:font script="Thaa" typeface="MV Boli"/>
-        <a:font script="Deva" typeface="Mangal"/>
-        <a:font script="Telu" typeface="Gautami"/>
-        <a:font script="Taml" typeface="Latha"/>
-        <a:font script="Syrc" typeface="Estrangelo Edessa"/>
-        <a:font script="Orya" typeface="Kalinga"/>
-        <a:font script="Mlym" typeface="Kartika"/>
-        <a:font script="Laoo" typeface="DokChampa"/>
-        <a:font script="Sinh" typeface="Iskoola Pota"/>
-        <a:font script="Mong" typeface="Mongolian Baiti"/>
-        <a:font script="Viet" typeface="Arial"/>
-        <a:font script="Uigh" typeface="Microsoft Uighur"/>
-        <a:font script="Geor" typeface="Sylfaen"/>
-      </a:minorFont>
-    </a:fontScheme>
-    <a:fmtScheme name="Office">
-      <a:fillStyleLst>
-        <a:solidFill>
-          <a:schemeClr val="phClr"/>
-        </a:solidFill>
-        <a:gradFill rotWithShape="1">
-          <a:gsLst>
-            <a:gs pos="0">
-              <a:schemeClr val="phClr">
-                <a:tint val="50000"/>
-                <a:satMod val="300000"/>
-              </a:schemeClr>
-            </a:gs>
-            <a:gs pos="35000">
-              <a:schemeClr val="phClr">
-                <a:tint val="37000"/>
-                <a:satMod val="300000"/>
-              </a:schemeClr>
-            </a:gs>
-            <a:gs pos="100000">
-              <a:schemeClr val="phClr">
-                <a:tint val="15000"/>
-                <a:satMod val="350000"/>
-              </a:schemeClr>
-            </a:gs>
-          </a:gsLst>
-          <a:lin ang="16200000" scaled="1"/>
-        </a:gradFill>
-        <a:gradFill rotWithShape="1">
-          <a:gsLst>
-            <a:gs pos="0">
-              <a:schemeClr val="phClr">
-                <a:tint val="100000"/>
-                <a:shade val="100000"/>
-                <a:satMod val="130000"/>
-              </a:schemeClr>
-            </a:gs>
-            <a:gs pos="100000">
-              <a:schemeClr val="phClr">
-                <a:tint val="50000"/>
-                <a:shade val="100000"/>
-                <a:satMod val="350000"/>
-              </a:schemeClr>
-            </a:gs>
-          </a:gsLst>
-          <a:lin ang="16200000" scaled="0"/>
-        </a:gradFill>
-      </a:fillStyleLst>
-      <a:lnStyleLst>
-        <a:ln w="9525" cap="flat" cmpd="sng" algn="ctr">
-          <a:solidFill>
-            <a:schemeClr val="phClr">
-              <a:shade val="95000"/>
-              <a:satMod val="105000"/>
-            </a:schemeClr>
-          </a:solidFill>
-          <a:prstDash val="solid"/>
-        </a:ln>
-        <a:ln w="25400" cap="flat" cmpd="sng" algn="ctr">
-          <a:solidFill>
-            <a:schemeClr val="phClr"/>
-          </a:solidFill>
-          <a:prstDash val="solid"/>
-        </a:ln>
-        <a:ln w="38100" cap="flat" cmpd="sng" algn="ctr">
-          <a:solidFill>
-            <a:schemeClr val="phClr"/>
-          </a:solidFill>
-          <a:prstDash val="solid"/>
-        </a:ln>
-      </a:lnStyleLst>
-      <a:effectStyleLst>
-        <a:effectStyle>
-          <a:effectLst>
-            <a:outerShdw blurRad="40000" dist="20000" dir="5400000" rotWithShape="0">
-              <a:srgbClr val="000000">
-                <a:alpha val="38000"/>
-              </a:srgbClr>
-            </a:outerShdw>
-          </a:effectLst>
-        </a:effectStyle>
-        <a:effectStyle>
-          <a:effectLst>
-            <a:outerShdw blurRad="40000" dist="23000" dir="5400000" rotWithShape="0">
-              <a:srgbClr val="000000">
-                <a:alpha val="35000"/>
-              </a:srgbClr>
-            </a:outerShdw>
-          </a:effectLst>
-        </a:effectStyle>
-        <a:effectStyle>
-          <a:effectLst>
-            <a:outerShdw blurRad="40000" dist="23000" dir="5400000" rotWithShape="0">
-              <a:srgbClr val="000000">
-                <a:alpha val="35000"/>
-              </a:srgbClr>
-            </a:outerShdw>
-          </a:effectLst>
-          <a:scene3d>
-            <a:camera prst="orthographicFront">
-              <a:rot lat="0" lon="0" rev="0"/>
-            </a:camera>
-            <a:lightRig rig="threePt" dir="t">
-              <a:rot lat="0" lon="0" rev="1200000"/>
-            </a:lightRig>
-          </a:scene3d>
-          <a:sp3d>
-            <a:bevelT w="63500" h="25400"/>
-          </a:sp3d>
-        </a:effectStyle>
-      </a:effectStyleLst>
-      <a:bgFillStyleLst>
-        <a:solidFill>
-          <a:schemeClr val="phClr"/>
-        </a:solidFill>
-        <a:gradFill rotWithShape="1">
-          <a:gsLst>
-            <a:gs pos="0">
-              <a:schemeClr val="phClr">
-                <a:tint val="40000"/>
-                <a:satMod val="350000"/>
-              </a:schemeClr>
-            </a:gs>
-            <a:gs pos="40000">
-              <a:schemeClr val="phClr">
-                <a:tint val="45000"/>
-                <a:shade val="99000"/>
-                <a:satMod val="350000"/>
-              </a:schemeClr>
-            </a:gs>
-            <a:gs pos="100000">
-              <a:schemeClr val="phClr">
-                <a:shade val="20000"/>
-                <a:satMod val="255000"/>
-              </a:schemeClr>
-            </a:gs>
-          </a:gsLst>
-          <a:path path="circle">
-            <a:fillToRect l="50000" t="-80000" r="50000" b="180000"/>
-          </a:path>
-        </a:gradFill>
-        <a:gradFill rotWithShape="1">
-          <a:gsLst>
-            <a:gs pos="0">
-              <a:schemeClr val="phClr">
-                <a:tint val="80000"/>
-                <a:satMod val="300000"/>
-              </a:schemeClr>
-            </a:gs>
-            <a:gs pos="100000">
-              <a:schemeClr val="phClr">
-                <a:shade val="30000"/>
-                <a:satMod val="200000"/>
-              </a:schemeClr>
-            </a:gs>
-          </a:gsLst>
-          <a:path path="circle">
-            <a:fillToRect l="50000" t="50000" r="50000" b="50000"/>
-          </a:path>
-        </a:gradFill>
-      </a:bgFillStyleLst>
-    </a:fmtScheme>
-  </a:themeElements>
-</a:theme>
 </file>
</xml_diff>